<commit_message>
Update AI Pathfinding algorithms..pptx
</commit_message>
<xml_diff>
--- a/AI Pathfinding algorithms..pptx
+++ b/AI Pathfinding algorithms..pptx
@@ -12,6 +12,7 @@
     <p:sldId id="261" r:id="rId9"/>
     <p:sldId id="262" r:id="rId10"/>
     <p:sldId id="263" r:id="rId11"/>
+    <p:sldId id="264" r:id="rId12"/>
   </p:sldIdLst>
   <p:sldSz cx="12192000" cy="6858000"/>
   <p:notesSz cx="6858000" cy="9144000"/>
@@ -8144,10 +8145,10 @@
       </p:sp>
       <p:pic>
         <p:nvPicPr>
-          <p:cNvPr id="6" name="Picture 5" descr="abstract image">
+          <p:cNvPr id="5" name="Picture 4">
             <a:extLst>
               <a:ext uri="{FF2B5EF4-FFF2-40B4-BE49-F238E27FC236}">
-                <a16:creationId xmlns:a16="http://schemas.microsoft.com/office/drawing/2014/main" id="{F1A8C364-94D4-4630-BAD0-78722F347055}"/>
+                <a16:creationId xmlns:a16="http://schemas.microsoft.com/office/drawing/2014/main" id="{2BE9DCE9-7304-4A28-9EB3-4AEEF5EDCE6C}"/>
               </a:ext>
             </a:extLst>
           </p:cNvPr>
@@ -8156,21 +8157,16 @@
           </p:cNvPicPr>
           <p:nvPr/>
         </p:nvPicPr>
-        <p:blipFill rotWithShape="1">
-          <a:blip r:embed="rId2">
-            <a:extLst>
-              <a:ext uri="{28A0092B-C50C-407E-A947-70E740481C1C}">
-                <a14:useLocalDpi xmlns:a14="http://schemas.microsoft.com/office/drawing/2010/main" val="0"/>
-              </a:ext>
-            </a:extLst>
-          </a:blip>
-          <a:srcRect/>
-          <a:stretch/>
+        <p:blipFill>
+          <a:blip r:embed="rId2"/>
+          <a:stretch>
+            <a:fillRect/>
+          </a:stretch>
         </p:blipFill>
         <p:spPr>
           <a:xfrm>
-            <a:off x="448733" y="3081867"/>
-            <a:ext cx="11260667" cy="3310466"/>
+            <a:off x="0" y="2870200"/>
+            <a:ext cx="12192000" cy="4059290"/>
           </a:xfrm>
           <a:prstGeom prst="rect">
             <a:avLst/>
@@ -8230,7 +8226,7 @@
           <a:p>
             <a:r>
               <a:rPr lang="en-US" dirty="0"/>
-              <a:t>THE PLAN</a:t>
+              <a:t>THE PLAN.</a:t>
             </a:r>
           </a:p>
         </p:txBody>
@@ -8378,7 +8374,7 @@
           <a:p>
             <a:r>
               <a:rPr lang="en-US" dirty="0"/>
-              <a:t>How events unfolded</a:t>
+              <a:t>How events unfolded.</a:t>
             </a:r>
           </a:p>
         </p:txBody>
@@ -8561,7 +8557,7 @@
           <a:p>
             <a:r>
               <a:rPr lang="en-US" dirty="0"/>
-              <a:t>What we could chew</a:t>
+              <a:t>What we could chew.</a:t>
             </a:r>
           </a:p>
         </p:txBody>
@@ -8648,7 +8644,7 @@
           <a:p>
             <a:r>
               <a:rPr lang="en-US" dirty="0"/>
-              <a:t>Cool things that worked</a:t>
+              <a:t>Cool things that worked.</a:t>
             </a:r>
           </a:p>
         </p:txBody>
@@ -8702,15 +8698,7 @@
           <a:p>
             <a:r>
               <a:rPr lang="en-US" dirty="0"/>
-              <a:t>And </a:t>
-            </a:r>
-            <a:r>
-              <a:rPr lang="en-US" dirty="0" err="1"/>
-              <a:t>Grisha</a:t>
-            </a:r>
-            <a:r>
-              <a:rPr lang="en-US" dirty="0"/>
-              <a:t> made this great GUI.</a:t>
+              <a:t>And we made this great GUI.</a:t>
             </a:r>
           </a:p>
           <a:p>
@@ -8855,7 +8843,7 @@
           <a:p>
             <a:r>
               <a:rPr lang="en-US" dirty="0"/>
-              <a:t>Things we learned</a:t>
+              <a:t>Things we learned.</a:t>
             </a:r>
           </a:p>
         </p:txBody>
@@ -8942,6 +8930,124 @@
     <p:extLst>
       <p:ext uri="{BB962C8B-B14F-4D97-AF65-F5344CB8AC3E}">
         <p14:creationId xmlns:p14="http://schemas.microsoft.com/office/powerpoint/2010/main" val="3507012747"/>
+      </p:ext>
+    </p:extLst>
+  </p:cSld>
+  <p:clrMapOvr>
+    <a:masterClrMapping/>
+  </p:clrMapOvr>
+</p:sld>
+</file>
+
+<file path=ppt/slides/slide8.xml><?xml version="1.0" encoding="utf-8"?>
+<p:sld xmlns:a="http://schemas.openxmlformats.org/drawingml/2006/main" xmlns:r="http://schemas.openxmlformats.org/officeDocument/2006/relationships" xmlns:p="http://schemas.openxmlformats.org/presentationml/2006/main">
+  <p:cSld>
+    <p:spTree>
+      <p:nvGrpSpPr>
+        <p:cNvPr id="1" name=""/>
+        <p:cNvGrpSpPr/>
+        <p:nvPr/>
+      </p:nvGrpSpPr>
+      <p:grpSpPr>
+        <a:xfrm>
+          <a:off x="0" y="0"/>
+          <a:ext cx="0" cy="0"/>
+          <a:chOff x="0" y="0"/>
+          <a:chExt cx="0" cy="0"/>
+        </a:xfrm>
+      </p:grpSpPr>
+      <p:sp>
+        <p:nvSpPr>
+          <p:cNvPr id="6" name="TextBox 5">
+            <a:extLst>
+              <a:ext uri="{FF2B5EF4-FFF2-40B4-BE49-F238E27FC236}">
+                <a16:creationId xmlns:a16="http://schemas.microsoft.com/office/drawing/2014/main" id="{5A3322E8-64BC-4934-B7BA-66FCEBD352D5}"/>
+              </a:ext>
+            </a:extLst>
+          </p:cNvPr>
+          <p:cNvSpPr txBox="1"/>
+          <p:nvPr/>
+        </p:nvSpPr>
+        <p:spPr>
+          <a:xfrm>
+            <a:off x="139700" y="1778000"/>
+            <a:ext cx="12649587" cy="954107"/>
+          </a:xfrm>
+          <a:prstGeom prst="rect">
+            <a:avLst/>
+          </a:prstGeom>
+          <a:noFill/>
+        </p:spPr>
+        <p:txBody>
+          <a:bodyPr wrap="square" rtlCol="0">
+            <a:spAutoFit/>
+          </a:bodyPr>
+          <a:lstStyle/>
+          <a:p>
+            <a:r>
+              <a:rPr lang="en-US" sz="2800" dirty="0"/>
+              <a:t>The plan is to continue the project, hopefully get something useful out of it.  The current hold up is a math error.</a:t>
+            </a:r>
+          </a:p>
+        </p:txBody>
+      </p:sp>
+      <p:sp>
+        <p:nvSpPr>
+          <p:cNvPr id="7" name="Title 6">
+            <a:extLst>
+              <a:ext uri="{FF2B5EF4-FFF2-40B4-BE49-F238E27FC236}">
+                <a16:creationId xmlns:a16="http://schemas.microsoft.com/office/drawing/2014/main" id="{C5BDF5D6-0FEE-49A8-9B66-93EEA8D123EE}"/>
+              </a:ext>
+            </a:extLst>
+          </p:cNvPr>
+          <p:cNvSpPr>
+            <a:spLocks noGrp="1"/>
+          </p:cNvSpPr>
+          <p:nvPr>
+            <p:ph type="title"/>
+          </p:nvPr>
+        </p:nvSpPr>
+        <p:spPr/>
+        <p:txBody>
+          <a:bodyPr/>
+          <a:lstStyle/>
+          <a:p>
+            <a:r>
+              <a:rPr lang="en-US" dirty="0"/>
+              <a:t>Epilogue.</a:t>
+            </a:r>
+          </a:p>
+        </p:txBody>
+      </p:sp>
+      <p:sp>
+        <p:nvSpPr>
+          <p:cNvPr id="8" name="Content Placeholder 7">
+            <a:extLst>
+              <a:ext uri="{FF2B5EF4-FFF2-40B4-BE49-F238E27FC236}">
+                <a16:creationId xmlns:a16="http://schemas.microsoft.com/office/drawing/2014/main" id="{C64B138C-BD1F-464A-9879-FD1C81C96372}"/>
+              </a:ext>
+            </a:extLst>
+          </p:cNvPr>
+          <p:cNvSpPr>
+            <a:spLocks noGrp="1"/>
+          </p:cNvSpPr>
+          <p:nvPr>
+            <p:ph idx="1"/>
+          </p:nvPr>
+        </p:nvSpPr>
+        <p:spPr/>
+        <p:txBody>
+          <a:bodyPr/>
+          <a:lstStyle/>
+          <a:p>
+            <a:endParaRPr lang="en-US"/>
+          </a:p>
+        </p:txBody>
+      </p:sp>
+    </p:spTree>
+    <p:extLst>
+      <p:ext uri="{BB962C8B-B14F-4D97-AF65-F5344CB8AC3E}">
+        <p14:creationId xmlns:p14="http://schemas.microsoft.com/office/powerpoint/2010/main" val="1684130678"/>
       </p:ext>
     </p:extLst>
   </p:cSld>

</xml_diff>